<commit_message>
updated figure and minor tweak to implementation guidance
</commit_message>
<xml_diff>
--- a/fsh/ig-data/input/images/Figures.pptx
+++ b/fsh/ig-data/input/images/Figures.pptx
@@ -263,7 +263,7 @@
           <a:p>
             <a:fld id="{6D5FDB8C-4C92-0C4C-BA60-9D07FDD2BD7F}" type="datetimeFigureOut">
               <a:rPr lang="en-US" smtClean="0"/>
-              <a:t>8/12/20</a:t>
+              <a:t>8/17/20</a:t>
             </a:fld>
             <a:endParaRPr lang="en-US"/>
           </a:p>
@@ -461,7 +461,7 @@
           <a:p>
             <a:fld id="{6D5FDB8C-4C92-0C4C-BA60-9D07FDD2BD7F}" type="datetimeFigureOut">
               <a:rPr lang="en-US" smtClean="0"/>
-              <a:t>8/12/20</a:t>
+              <a:t>8/17/20</a:t>
             </a:fld>
             <a:endParaRPr lang="en-US"/>
           </a:p>
@@ -669,7 +669,7 @@
           <a:p>
             <a:fld id="{6D5FDB8C-4C92-0C4C-BA60-9D07FDD2BD7F}" type="datetimeFigureOut">
               <a:rPr lang="en-US" smtClean="0"/>
-              <a:t>8/12/20</a:t>
+              <a:t>8/17/20</a:t>
             </a:fld>
             <a:endParaRPr lang="en-US"/>
           </a:p>
@@ -867,7 +867,7 @@
           <a:p>
             <a:fld id="{6D5FDB8C-4C92-0C4C-BA60-9D07FDD2BD7F}" type="datetimeFigureOut">
               <a:rPr lang="en-US" smtClean="0"/>
-              <a:t>8/12/20</a:t>
+              <a:t>8/17/20</a:t>
             </a:fld>
             <a:endParaRPr lang="en-US"/>
           </a:p>
@@ -1142,7 +1142,7 @@
           <a:p>
             <a:fld id="{6D5FDB8C-4C92-0C4C-BA60-9D07FDD2BD7F}" type="datetimeFigureOut">
               <a:rPr lang="en-US" smtClean="0"/>
-              <a:t>8/12/20</a:t>
+              <a:t>8/17/20</a:t>
             </a:fld>
             <a:endParaRPr lang="en-US"/>
           </a:p>
@@ -1407,7 +1407,7 @@
           <a:p>
             <a:fld id="{6D5FDB8C-4C92-0C4C-BA60-9D07FDD2BD7F}" type="datetimeFigureOut">
               <a:rPr lang="en-US" smtClean="0"/>
-              <a:t>8/12/20</a:t>
+              <a:t>8/17/20</a:t>
             </a:fld>
             <a:endParaRPr lang="en-US"/>
           </a:p>
@@ -1819,7 +1819,7 @@
           <a:p>
             <a:fld id="{6D5FDB8C-4C92-0C4C-BA60-9D07FDD2BD7F}" type="datetimeFigureOut">
               <a:rPr lang="en-US" smtClean="0"/>
-              <a:t>8/12/20</a:t>
+              <a:t>8/17/20</a:t>
             </a:fld>
             <a:endParaRPr lang="en-US"/>
           </a:p>
@@ -1960,7 +1960,7 @@
           <a:p>
             <a:fld id="{6D5FDB8C-4C92-0C4C-BA60-9D07FDD2BD7F}" type="datetimeFigureOut">
               <a:rPr lang="en-US" smtClean="0"/>
-              <a:t>8/12/20</a:t>
+              <a:t>8/17/20</a:t>
             </a:fld>
             <a:endParaRPr lang="en-US"/>
           </a:p>
@@ -2073,7 +2073,7 @@
           <a:p>
             <a:fld id="{6D5FDB8C-4C92-0C4C-BA60-9D07FDD2BD7F}" type="datetimeFigureOut">
               <a:rPr lang="en-US" smtClean="0"/>
-              <a:t>8/12/20</a:t>
+              <a:t>8/17/20</a:t>
             </a:fld>
             <a:endParaRPr lang="en-US"/>
           </a:p>
@@ -2384,7 +2384,7 @@
           <a:p>
             <a:fld id="{6D5FDB8C-4C92-0C4C-BA60-9D07FDD2BD7F}" type="datetimeFigureOut">
               <a:rPr lang="en-US" smtClean="0"/>
-              <a:t>8/12/20</a:t>
+              <a:t>8/17/20</a:t>
             </a:fld>
             <a:endParaRPr lang="en-US"/>
           </a:p>
@@ -2672,7 +2672,7 @@
           <a:p>
             <a:fld id="{6D5FDB8C-4C92-0C4C-BA60-9D07FDD2BD7F}" type="datetimeFigureOut">
               <a:rPr lang="en-US" smtClean="0"/>
-              <a:t>8/12/20</a:t>
+              <a:t>8/17/20</a:t>
             </a:fld>
             <a:endParaRPr lang="en-US"/>
           </a:p>
@@ -2913,7 +2913,7 @@
           <a:p>
             <a:fld id="{6D5FDB8C-4C92-0C4C-BA60-9D07FDD2BD7F}" type="datetimeFigureOut">
               <a:rPr lang="en-US" smtClean="0"/>
-              <a:t>8/12/20</a:t>
+              <a:t>8/17/20</a:t>
             </a:fld>
             <a:endParaRPr lang="en-US"/>
           </a:p>
@@ -10112,6 +10112,307 @@
           </a:p>
         </p:txBody>
       </p:sp>
+      <p:sp>
+        <p:nvSpPr>
+          <p:cNvPr id="78" name="TextBox 77">
+            <a:extLst>
+              <a:ext uri="{FF2B5EF4-FFF2-40B4-BE49-F238E27FC236}">
+                <a16:creationId xmlns:a16="http://schemas.microsoft.com/office/drawing/2014/main" id="{393BC457-5FD0-D64C-83C0-346A44CADAD3}"/>
+              </a:ext>
+            </a:extLst>
+          </p:cNvPr>
+          <p:cNvSpPr txBox="1"/>
+          <p:nvPr/>
+        </p:nvSpPr>
+        <p:spPr>
+          <a:xfrm>
+            <a:off x="8298833" y="2944341"/>
+            <a:ext cx="1343060" cy="369332"/>
+          </a:xfrm>
+          <a:prstGeom prst="rect">
+            <a:avLst/>
+          </a:prstGeom>
+          <a:noFill/>
+        </p:spPr>
+        <p:txBody>
+          <a:bodyPr wrap="none" rtlCol="0">
+            <a:spAutoFit/>
+          </a:bodyPr>
+          <a:lstStyle/>
+          <a:p>
+            <a:r>
+              <a:rPr lang="en-US" dirty="0"/>
+              <a:t>organization</a:t>
+            </a:r>
+          </a:p>
+        </p:txBody>
+      </p:sp>
+      <p:sp>
+        <p:nvSpPr>
+          <p:cNvPr id="79" name="Rounded Rectangle 78">
+            <a:extLst>
+              <a:ext uri="{FF2B5EF4-FFF2-40B4-BE49-F238E27FC236}">
+                <a16:creationId xmlns:a16="http://schemas.microsoft.com/office/drawing/2014/main" id="{F7059093-5871-1849-9D36-F50490C6C513}"/>
+              </a:ext>
+            </a:extLst>
+          </p:cNvPr>
+          <p:cNvSpPr/>
+          <p:nvPr/>
+        </p:nvSpPr>
+        <p:spPr>
+          <a:xfrm>
+            <a:off x="9603183" y="3281623"/>
+            <a:ext cx="1700458" cy="646546"/>
+          </a:xfrm>
+          <a:prstGeom prst="roundRect">
+            <a:avLst/>
+          </a:prstGeom>
+          <a:solidFill>
+            <a:schemeClr val="accent1">
+              <a:lumMod val="20000"/>
+              <a:lumOff val="80000"/>
+            </a:schemeClr>
+          </a:solidFill>
+        </p:spPr>
+        <p:style>
+          <a:lnRef idx="1">
+            <a:schemeClr val="accent1"/>
+          </a:lnRef>
+          <a:fillRef idx="3">
+            <a:schemeClr val="accent1"/>
+          </a:fillRef>
+          <a:effectRef idx="2">
+            <a:schemeClr val="accent1"/>
+          </a:effectRef>
+          <a:fontRef idx="minor">
+            <a:schemeClr val="lt1"/>
+          </a:fontRef>
+        </p:style>
+        <p:txBody>
+          <a:bodyPr rtlCol="0" anchor="ctr"/>
+          <a:lstStyle/>
+          <a:p>
+            <a:pPr algn="ctr"/>
+            <a:r>
+              <a:rPr lang="en-US" sz="1600" dirty="0">
+                <a:solidFill>
+                  <a:sysClr val="windowText" lastClr="000000"/>
+                </a:solidFill>
+              </a:rPr>
+              <a:t>Organization</a:t>
+            </a:r>
+          </a:p>
+        </p:txBody>
+      </p:sp>
+      <p:cxnSp>
+        <p:nvCxnSpPr>
+          <p:cNvPr id="113" name="Straight Arrow Connector 112">
+            <a:extLst>
+              <a:ext uri="{FF2B5EF4-FFF2-40B4-BE49-F238E27FC236}">
+                <a16:creationId xmlns:a16="http://schemas.microsoft.com/office/drawing/2014/main" id="{F340A35C-7573-7649-B6D9-6DD8B12E4348}"/>
+              </a:ext>
+            </a:extLst>
+          </p:cNvPr>
+          <p:cNvCxnSpPr>
+            <a:cxnSpLocks/>
+            <a:endCxn id="79" idx="1"/>
+          </p:cNvCxnSpPr>
+          <p:nvPr/>
+        </p:nvCxnSpPr>
+        <p:spPr>
+          <a:xfrm>
+            <a:off x="8380315" y="3604741"/>
+            <a:ext cx="1222868" cy="155"/>
+          </a:xfrm>
+          <a:prstGeom prst="straightConnector1">
+            <a:avLst/>
+          </a:prstGeom>
+          <a:ln>
+            <a:headEnd type="none" w="lg" len="lg"/>
+            <a:tailEnd type="triangle" w="lg" len="lg"/>
+          </a:ln>
+        </p:spPr>
+        <p:style>
+          <a:lnRef idx="2">
+            <a:schemeClr val="accent1"/>
+          </a:lnRef>
+          <a:fillRef idx="0">
+            <a:schemeClr val="accent1"/>
+          </a:fillRef>
+          <a:effectRef idx="1">
+            <a:schemeClr val="accent1"/>
+          </a:effectRef>
+          <a:fontRef idx="minor">
+            <a:schemeClr val="tx1"/>
+          </a:fontRef>
+        </p:style>
+      </p:cxnSp>
+      <p:sp>
+        <p:nvSpPr>
+          <p:cNvPr id="114" name="Rectangle 113">
+            <a:extLst>
+              <a:ext uri="{FF2B5EF4-FFF2-40B4-BE49-F238E27FC236}">
+                <a16:creationId xmlns:a16="http://schemas.microsoft.com/office/drawing/2014/main" id="{EEF8DD66-EAC4-984C-8A42-162B6A7115E3}"/>
+              </a:ext>
+            </a:extLst>
+          </p:cNvPr>
+          <p:cNvSpPr/>
+          <p:nvPr/>
+        </p:nvSpPr>
+        <p:spPr>
+          <a:xfrm>
+            <a:off x="8662857" y="3306816"/>
+            <a:ext cx="657783" cy="307777"/>
+          </a:xfrm>
+          <a:prstGeom prst="rect">
+            <a:avLst/>
+          </a:prstGeom>
+        </p:spPr>
+        <p:txBody>
+          <a:bodyPr wrap="square">
+            <a:spAutoFit/>
+          </a:bodyPr>
+          <a:lstStyle/>
+          <a:p>
+            <a:r>
+              <a:rPr lang="en-US" sz="1400" dirty="0">
+                <a:solidFill>
+                  <a:srgbClr val="333333"/>
+                </a:solidFill>
+                <a:latin typeface="verdana" panose="020B0604030504040204" pitchFamily="34" charset="0"/>
+              </a:rPr>
+              <a:t>0..1</a:t>
+            </a:r>
+            <a:endParaRPr lang="en-US" sz="1400" dirty="0"/>
+          </a:p>
+        </p:txBody>
+      </p:sp>
+      <p:sp>
+        <p:nvSpPr>
+          <p:cNvPr id="115" name="TextBox 114">
+            <a:extLst>
+              <a:ext uri="{FF2B5EF4-FFF2-40B4-BE49-F238E27FC236}">
+                <a16:creationId xmlns:a16="http://schemas.microsoft.com/office/drawing/2014/main" id="{CA825217-5E9C-A342-9825-FDDFB419211F}"/>
+              </a:ext>
+            </a:extLst>
+          </p:cNvPr>
+          <p:cNvSpPr txBox="1"/>
+          <p:nvPr/>
+        </p:nvSpPr>
+        <p:spPr>
+          <a:xfrm>
+            <a:off x="11259142" y="3729548"/>
+            <a:ext cx="797013" cy="369332"/>
+          </a:xfrm>
+          <a:prstGeom prst="rect">
+            <a:avLst/>
+          </a:prstGeom>
+          <a:noFill/>
+        </p:spPr>
+        <p:txBody>
+          <a:bodyPr wrap="none" rtlCol="0">
+            <a:spAutoFit/>
+          </a:bodyPr>
+          <a:lstStyle/>
+          <a:p>
+            <a:r>
+              <a:rPr lang="en-US" dirty="0" err="1"/>
+              <a:t>partOf</a:t>
+            </a:r>
+            <a:endParaRPr lang="en-US" dirty="0"/>
+          </a:p>
+        </p:txBody>
+      </p:sp>
+      <p:sp>
+        <p:nvSpPr>
+          <p:cNvPr id="116" name="Rectangle 115">
+            <a:extLst>
+              <a:ext uri="{FF2B5EF4-FFF2-40B4-BE49-F238E27FC236}">
+                <a16:creationId xmlns:a16="http://schemas.microsoft.com/office/drawing/2014/main" id="{DA49B177-3DA4-7043-AE89-57CF5F40F8ED}"/>
+              </a:ext>
+            </a:extLst>
+          </p:cNvPr>
+          <p:cNvSpPr/>
+          <p:nvPr/>
+        </p:nvSpPr>
+        <p:spPr>
+          <a:xfrm>
+            <a:off x="11186212" y="3064962"/>
+            <a:ext cx="657783" cy="307777"/>
+          </a:xfrm>
+          <a:prstGeom prst="rect">
+            <a:avLst/>
+          </a:prstGeom>
+        </p:spPr>
+        <p:txBody>
+          <a:bodyPr wrap="square">
+            <a:spAutoFit/>
+          </a:bodyPr>
+          <a:lstStyle/>
+          <a:p>
+            <a:r>
+              <a:rPr lang="en-US" sz="1400" dirty="0">
+                <a:solidFill>
+                  <a:srgbClr val="333333"/>
+                </a:solidFill>
+                <a:latin typeface="verdana" panose="020B0604030504040204" pitchFamily="34" charset="0"/>
+              </a:rPr>
+              <a:t>0..1</a:t>
+            </a:r>
+            <a:endParaRPr lang="en-US" sz="1400" dirty="0"/>
+          </a:p>
+        </p:txBody>
+      </p:sp>
+      <p:sp>
+        <p:nvSpPr>
+          <p:cNvPr id="117" name="Curved Left Arrow 116">
+            <a:extLst>
+              <a:ext uri="{FF2B5EF4-FFF2-40B4-BE49-F238E27FC236}">
+                <a16:creationId xmlns:a16="http://schemas.microsoft.com/office/drawing/2014/main" id="{040E4C28-F327-C345-81E9-7268ED93720C}"/>
+              </a:ext>
+            </a:extLst>
+          </p:cNvPr>
+          <p:cNvSpPr/>
+          <p:nvPr/>
+        </p:nvSpPr>
+        <p:spPr>
+          <a:xfrm>
+            <a:off x="11308777" y="3418911"/>
+            <a:ext cx="349956" cy="365125"/>
+          </a:xfrm>
+          <a:prstGeom prst="curvedLeftArrow">
+            <a:avLst/>
+          </a:prstGeom>
+        </p:spPr>
+        <p:style>
+          <a:lnRef idx="2">
+            <a:schemeClr val="accent1">
+              <a:shade val="50000"/>
+            </a:schemeClr>
+          </a:lnRef>
+          <a:fillRef idx="1">
+            <a:schemeClr val="accent1"/>
+          </a:fillRef>
+          <a:effectRef idx="0">
+            <a:schemeClr val="accent1"/>
+          </a:effectRef>
+          <a:fontRef idx="minor">
+            <a:schemeClr val="lt1"/>
+          </a:fontRef>
+        </p:style>
+        <p:txBody>
+          <a:bodyPr rtlCol="0" anchor="ctr"/>
+          <a:lstStyle/>
+          <a:p>
+            <a:pPr algn="ctr"/>
+            <a:endParaRPr lang="en-US">
+              <a:solidFill>
+                <a:schemeClr val="tx1"/>
+              </a:solidFill>
+            </a:endParaRPr>
+          </a:p>
+        </p:txBody>
+      </p:sp>
     </p:spTree>
     <p:extLst>
       <p:ext uri="{BB962C8B-B14F-4D97-AF65-F5344CB8AC3E}">

</xml_diff>

<commit_message>
2nd round of Mark Kramer changes
</commit_message>
<xml_diff>
--- a/fsh/ig-data/input/images/Figures.pptx
+++ b/fsh/ig-data/input/images/Figures.pptx
@@ -7133,7 +7133,7 @@
         </p:nvSpPr>
         <p:spPr>
           <a:xfrm>
-            <a:off x="5520727" y="3575347"/>
+            <a:off x="5337847" y="3618378"/>
             <a:ext cx="1344349" cy="646546"/>
           </a:xfrm>
           <a:prstGeom prst="roundRect">
@@ -7190,7 +7190,7 @@
         </p:nvSpPr>
         <p:spPr>
           <a:xfrm>
-            <a:off x="5342673" y="2104645"/>
+            <a:off x="5159793" y="2147676"/>
             <a:ext cx="1700458" cy="646546"/>
           </a:xfrm>
           <a:prstGeom prst="roundRect">
@@ -7250,7 +7250,7 @@
         </p:nvCxnSpPr>
         <p:spPr>
           <a:xfrm flipV="1">
-            <a:off x="6192902" y="2773857"/>
+            <a:off x="6010022" y="2816888"/>
             <a:ext cx="0" cy="801490"/>
           </a:xfrm>
           <a:prstGeom prst="straightConnector1">
@@ -7290,7 +7290,7 @@
         </p:nvSpPr>
         <p:spPr>
           <a:xfrm>
-            <a:off x="6302176" y="2932484"/>
+            <a:off x="6119296" y="2975515"/>
             <a:ext cx="2293641" cy="369332"/>
           </a:xfrm>
           <a:prstGeom prst="rect">
@@ -7325,7 +7325,7 @@
         </p:nvSpPr>
         <p:spPr>
           <a:xfrm>
-            <a:off x="7387520" y="2065753"/>
+            <a:off x="7204640" y="2108784"/>
             <a:ext cx="797013" cy="369332"/>
           </a:xfrm>
           <a:prstGeom prst="rect">
@@ -7360,7 +7360,7 @@
         </p:nvSpPr>
         <p:spPr>
           <a:xfrm>
-            <a:off x="6914999" y="1831114"/>
+            <a:off x="6732119" y="1874145"/>
             <a:ext cx="657783" cy="307777"/>
           </a:xfrm>
           <a:prstGeom prst="rect">
@@ -7400,7 +7400,7 @@
         </p:nvSpPr>
         <p:spPr>
           <a:xfrm>
-            <a:off x="7037564" y="2185063"/>
+            <a:off x="6854684" y="2228094"/>
             <a:ext cx="349956" cy="365125"/>
           </a:xfrm>
           <a:prstGeom prst="curvedLeftArrow">
@@ -7450,7 +7450,7 @@
         </p:nvSpPr>
         <p:spPr>
           <a:xfrm>
-            <a:off x="6586107" y="3220455"/>
+            <a:off x="6403227" y="3263486"/>
             <a:ext cx="657783" cy="307777"/>
           </a:xfrm>
           <a:prstGeom prst="rect">
@@ -7490,7 +7490,7 @@
         </p:nvSpPr>
         <p:spPr>
           <a:xfrm>
-            <a:off x="157576" y="3679442"/>
+            <a:off x="108205" y="3729990"/>
             <a:ext cx="1833967" cy="646546"/>
           </a:xfrm>
           <a:prstGeom prst="roundRect">
@@ -7547,7 +7547,7 @@
         </p:nvSpPr>
         <p:spPr>
           <a:xfrm>
-            <a:off x="7826515" y="5095520"/>
+            <a:off x="7643635" y="5138551"/>
             <a:ext cx="1700458" cy="646546"/>
           </a:xfrm>
           <a:prstGeom prst="roundRect">
@@ -7604,7 +7604,7 @@
         </p:nvSpPr>
         <p:spPr>
           <a:xfrm>
-            <a:off x="291085" y="5057290"/>
+            <a:off x="108205" y="5100321"/>
             <a:ext cx="1700458" cy="646546"/>
           </a:xfrm>
           <a:prstGeom prst="roundRect">
@@ -7661,7 +7661,7 @@
         </p:nvSpPr>
         <p:spPr>
           <a:xfrm>
-            <a:off x="3013661" y="5054473"/>
+            <a:off x="2830781" y="5097504"/>
             <a:ext cx="1700458" cy="646546"/>
           </a:xfrm>
           <a:prstGeom prst="roundRect">
@@ -7718,7 +7718,7 @@
         </p:nvSpPr>
         <p:spPr>
           <a:xfrm>
-            <a:off x="5341166" y="5058576"/>
+            <a:off x="5158286" y="5101607"/>
             <a:ext cx="1700458" cy="646546"/>
           </a:xfrm>
           <a:prstGeom prst="roundRect">
@@ -7775,7 +7775,7 @@
         </p:nvSpPr>
         <p:spPr>
           <a:xfrm>
-            <a:off x="9975339" y="5095520"/>
+            <a:off x="9792459" y="5138551"/>
             <a:ext cx="2216661" cy="646546"/>
           </a:xfrm>
           <a:prstGeom prst="roundRect">
@@ -7832,7 +7832,7 @@
         </p:nvSpPr>
         <p:spPr>
           <a:xfrm>
-            <a:off x="9988187" y="3671380"/>
+            <a:off x="9805307" y="3714411"/>
             <a:ext cx="2216661" cy="646546"/>
           </a:xfrm>
           <a:prstGeom prst="roundRect">
@@ -7889,7 +7889,7 @@
         </p:nvSpPr>
         <p:spPr>
           <a:xfrm>
-            <a:off x="2845116" y="3671380"/>
+            <a:off x="2662236" y="3714411"/>
             <a:ext cx="657783" cy="307777"/>
           </a:xfrm>
           <a:prstGeom prst="rect">
@@ -7933,8 +7933,8 @@
         </p:nvCxnSpPr>
         <p:spPr>
           <a:xfrm flipV="1">
-            <a:off x="1991543" y="3898620"/>
-            <a:ext cx="3529184" cy="104095"/>
+            <a:off x="1942172" y="3941651"/>
+            <a:ext cx="3395675" cy="111612"/>
           </a:xfrm>
           <a:prstGeom prst="straightConnector1">
             <a:avLst/>
@@ -7977,7 +7977,7 @@
         </p:nvCxnSpPr>
         <p:spPr>
           <a:xfrm flipH="1" flipV="1">
-            <a:off x="6865076" y="3898620"/>
+            <a:off x="6682196" y="3941651"/>
             <a:ext cx="3123111" cy="96033"/>
           </a:xfrm>
           <a:prstGeom prst="straightConnector1">
@@ -8017,7 +8017,7 @@
         </p:nvSpPr>
         <p:spPr>
           <a:xfrm>
-            <a:off x="7780186" y="3702455"/>
+            <a:off x="7597306" y="3745486"/>
             <a:ext cx="657783" cy="307777"/>
           </a:xfrm>
           <a:prstGeom prst="rect">
@@ -8059,7 +8059,7 @@
         </p:nvCxnSpPr>
         <p:spPr>
           <a:xfrm flipV="1">
-            <a:off x="1918252" y="4079469"/>
+            <a:off x="1735372" y="4122500"/>
             <a:ext cx="3623527" cy="1016052"/>
           </a:xfrm>
           <a:prstGeom prst="straightConnector1">
@@ -8099,7 +8099,7 @@
         </p:nvSpPr>
         <p:spPr>
           <a:xfrm>
-            <a:off x="2684769" y="4447497"/>
+            <a:off x="2501889" y="4490528"/>
             <a:ext cx="657783" cy="307777"/>
           </a:xfrm>
           <a:prstGeom prst="rect">
@@ -8142,7 +8142,7 @@
         </p:nvCxnSpPr>
         <p:spPr>
           <a:xfrm flipV="1">
-            <a:off x="3863890" y="4244387"/>
+            <a:off x="3681010" y="4287418"/>
             <a:ext cx="1671229" cy="810086"/>
           </a:xfrm>
           <a:prstGeom prst="straightConnector1">
@@ -8182,7 +8182,7 @@
         </p:nvSpPr>
         <p:spPr>
           <a:xfrm>
-            <a:off x="4143195" y="4705648"/>
+            <a:off x="3960315" y="4748679"/>
             <a:ext cx="657783" cy="307777"/>
           </a:xfrm>
           <a:prstGeom prst="rect">
@@ -8226,7 +8226,7 @@
         </p:nvCxnSpPr>
         <p:spPr>
           <a:xfrm flipV="1">
-            <a:off x="6191395" y="4221893"/>
+            <a:off x="6008515" y="4264924"/>
             <a:ext cx="1507" cy="836683"/>
           </a:xfrm>
           <a:prstGeom prst="straightConnector1">
@@ -8268,7 +8268,7 @@
         </p:nvCxnSpPr>
         <p:spPr>
           <a:xfrm flipH="1" flipV="1">
-            <a:off x="6508872" y="4244387"/>
+            <a:off x="6325992" y="4287418"/>
             <a:ext cx="1330950" cy="883092"/>
           </a:xfrm>
           <a:prstGeom prst="straightConnector1">
@@ -8310,7 +8310,7 @@
         </p:nvCxnSpPr>
         <p:spPr>
           <a:xfrm flipH="1" flipV="1">
-            <a:off x="6871736" y="4160497"/>
+            <a:off x="6688856" y="4203528"/>
             <a:ext cx="3176726" cy="966981"/>
           </a:xfrm>
           <a:prstGeom prst="straightConnector1">
@@ -8350,7 +8350,7 @@
         </p:nvSpPr>
         <p:spPr>
           <a:xfrm>
-            <a:off x="5602780" y="4747756"/>
+            <a:off x="5419900" y="4790787"/>
             <a:ext cx="657783" cy="307777"/>
           </a:xfrm>
           <a:prstGeom prst="rect">
@@ -8390,7 +8390,7 @@
         </p:nvSpPr>
         <p:spPr>
           <a:xfrm>
-            <a:off x="7575578" y="4802086"/>
+            <a:off x="7392698" y="4845117"/>
             <a:ext cx="657783" cy="307777"/>
           </a:xfrm>
           <a:prstGeom prst="rect">
@@ -8430,7 +8430,7 @@
         </p:nvSpPr>
         <p:spPr>
           <a:xfrm>
-            <a:off x="9708970" y="4800497"/>
+            <a:off x="9526090" y="4843528"/>
             <a:ext cx="657783" cy="307777"/>
           </a:xfrm>
           <a:prstGeom prst="rect">

</xml_diff>